<commit_message>
second version of IFML
</commit_message>
<xml_diff>
--- a/doc/HTML/TIW_PRJ5_2020_2021_v4.pptx
+++ b/doc/HTML/TIW_PRJ5_2020_2021_v4.pptx
@@ -226,7 +226,7 @@
           <a:effectLst/>
           <a:extLst>
             <a:ext uri="{91240B29-F687-4f45-9708-019B960494DF}">
-              <a14:hiddenLine xmlns="" xmlns:a14="http://schemas.microsoft.com/office/drawing/2010/main" w="9525">
+              <a14:hiddenLine xmlns:a14="http://schemas.microsoft.com/office/drawing/2010/main" xmlns="" w="9525">
                 <a:solidFill>
                   <a:srgbClr val="000000"/>
                 </a:solidFill>
@@ -1736,7 +1736,7 @@
           <a:ln/>
           <a:extLst>
             <a:ext uri="{91240B29-F687-4f45-9708-019B960494DF}">
-              <a14:hiddenLine xmlns="" xmlns:a14="http://schemas.microsoft.com/office/drawing/2010/main" w="9525">
+              <a14:hiddenLine xmlns:a14="http://schemas.microsoft.com/office/drawing/2010/main" xmlns="" w="9525">
                 <a:solidFill>
                   <a:srgbClr val="000000"/>
                 </a:solidFill>
@@ -2008,7 +2008,7 @@
           <a:ln/>
           <a:extLst>
             <a:ext uri="{91240B29-F687-4f45-9708-019B960494DF}">
-              <a14:hiddenLine xmlns="" xmlns:a14="http://schemas.microsoft.com/office/drawing/2010/main" w="9525">
+              <a14:hiddenLine xmlns:a14="http://schemas.microsoft.com/office/drawing/2010/main" xmlns="" w="9525">
                 <a:solidFill>
                   <a:srgbClr val="000000"/>
                 </a:solidFill>
@@ -2288,7 +2288,7 @@
           <a:ln/>
           <a:extLst>
             <a:ext uri="{91240B29-F687-4f45-9708-019B960494DF}">
-              <a14:hiddenLine xmlns="" xmlns:a14="http://schemas.microsoft.com/office/drawing/2010/main" w="9525">
+              <a14:hiddenLine xmlns:a14="http://schemas.microsoft.com/office/drawing/2010/main" xmlns="" w="9525">
                 <a:solidFill>
                   <a:srgbClr val="000000"/>
                 </a:solidFill>
@@ -2908,7 +2908,7 @@
           <a:ln/>
           <a:extLst>
             <a:ext uri="{91240B29-F687-4f45-9708-019B960494DF}">
-              <a14:hiddenLine xmlns="" xmlns:a14="http://schemas.microsoft.com/office/drawing/2010/main" w="9525">
+              <a14:hiddenLine xmlns:a14="http://schemas.microsoft.com/office/drawing/2010/main" xmlns="" w="9525">
                 <a:solidFill>
                   <a:srgbClr val="000000"/>
                 </a:solidFill>
@@ -3244,7 +3244,7 @@
           <a:ln/>
           <a:extLst>
             <a:ext uri="{91240B29-F687-4f45-9708-019B960494DF}">
-              <a14:hiddenLine xmlns="" xmlns:a14="http://schemas.microsoft.com/office/drawing/2010/main" w="9525">
+              <a14:hiddenLine xmlns:a14="http://schemas.microsoft.com/office/drawing/2010/main" xmlns="" w="9525">
                 <a:solidFill>
                   <a:srgbClr val="000000"/>
                 </a:solidFill>
@@ -3718,7 +3718,7 @@
           <a:ln/>
           <a:extLst>
             <a:ext uri="{91240B29-F687-4f45-9708-019B960494DF}">
-              <a14:hiddenLine xmlns="" xmlns:a14="http://schemas.microsoft.com/office/drawing/2010/main" w="9525">
+              <a14:hiddenLine xmlns:a14="http://schemas.microsoft.com/office/drawing/2010/main" xmlns="" w="9525">
                 <a:solidFill>
                   <a:srgbClr val="000000"/>
                 </a:solidFill>
@@ -4141,7 +4141,7 @@
           <a:ln/>
           <a:extLst>
             <a:ext uri="{91240B29-F687-4f45-9708-019B960494DF}">
-              <a14:hiddenLine xmlns="" xmlns:a14="http://schemas.microsoft.com/office/drawing/2010/main" w="9525">
+              <a14:hiddenLine xmlns:a14="http://schemas.microsoft.com/office/drawing/2010/main" xmlns="" w="9525">
                 <a:solidFill>
                   <a:srgbClr val="000000"/>
                 </a:solidFill>
@@ -8186,39 +8186,7 @@
             </a:r>
             <a:r>
               <a:rPr lang="it-IT" dirty="0"/>
-              <a:t>oltre al quale la spedizione è gratuita. Se il totale supera la soglia per la gratuità della spedizione, la spedizione è gratuita indipendentemente dal numero di articoli. Dopo il login, l’utente accede a una pagina HOME che mostra (come tutte le altre pagine) un menù con i link HOME, CARRELLO, ORDINI, un campo di ricerca e una lista degli ultimi cinque prodotti visualizzati dall’utente. Se l’utente non ha visualizzato almeno cinque prodotti, la lista è completata con prodotti in offerta scelti a caso in una categoria di default. L’utente può inserire una parola chiave di ricerca nel campo di input e premere INVIO</a:t>
-            </a:r>
-            <a:r>
-              <a:rPr lang="it-IT" dirty="0"/>
-              <a:t>. A seguito dell’invio </a:t>
-            </a:r>
-            <a:r>
-              <a:rPr lang="it-IT" dirty="0"/>
-              <a:t>compare</a:t>
-            </a:r>
-            <a:r>
-              <a:rPr lang="it-IT" dirty="0"/>
-              <a:t> una pagina RISULTATI con prodotti che contengono la chiave di ricerca nel nome o nella descrizione. L’elenco mostra solo il </a:t>
-            </a:r>
-            <a:r>
-              <a:rPr lang="it-IT" dirty="0"/>
-              <a:t>codice, il nome del prodotto e il prezzo minimo di vendita ed è </a:t>
-            </a:r>
-            <a:r>
-              <a:rPr lang="it-IT" dirty="0"/>
-              <a:t>ordinato </a:t>
-            </a:r>
-            <a:r>
-              <a:rPr lang="it-IT" dirty="0"/>
-              <a:t>in modo crescente in base al prezzo minimo di vendita dell’articolo da parte dei fornitori che lo offrono. L’utente può selezionare mediante un click un elemento dell'elenco e visualizzare nella stessa pagina i dati completi e l’elenco dei fornitori che lo vendono (questa azione rende l’articolo “visualizzato”). Per ogni fornitore in tale elenco compaiono: nome, valutazione, prezzo unitario, fasce di spesa di spedizione, importo minimo della spedizione gratuita e il numero degli articoli e valore totale degli articoli di quel fornitore che l’utente ha già messo nel carrello. Accanto all’offerta di ciascun fornitore compare un campo di input intero (quantità) e un bottone METTI NEL CARRELLO. L’inserimento nel carrello di una quantità maggiore di zero di articoli comporta l’aggiornamento del contenuto del  carrello e la visualizzazione della pagina CARRELLO. Questa mostra gli articoli inseriti, raggruppati per fornitore. Per ogni fornitore nel carrello si vedono </a:t>
-            </a:r>
-            <a:r>
-              <a:rPr lang="it-IT" dirty="0"/>
-              <a:t>la lista degli articoli, il prezzo totale degli articoli e il prezzo della spedizione calcolato </a:t>
-            </a:r>
-            <a:r>
-              <a:rPr lang="it-IT" dirty="0"/>
-              <a:t>in base alla politica del fornitore. Per ogni fornitore  compare un bottone ORDINA. Premere il bottone comporta l’eliminazione degli articoli del fornitore dal carrello e la creazione di un ordine corrispondente. Un </a:t>
+              <a:t>oltre al quale la spedizione è gratuita. Se il totale supera la soglia per la gratuità della spedizione, la spedizione è gratuita indipendentemente dal numero di articoli. Dopo il login, l’utente accede a una pagina HOME che mostra (come tutte le altre pagine) un menù con i link HOME, CARRELLO, ORDINI, un campo di ricerca e una lista degli ultimi cinque prodotti visualizzati dall’utente. Se l’utente non ha visualizzato almeno cinque prodotti, la lista è completata con prodotti in offerta scelti a caso in una categoria di default. L’utente può inserire una parola chiave di ricerca nel campo di input e premere INVIO. A seguito dell’invio compare una pagina RISULTATI con prodotti che contengono la chiave di ricerca nel nome o nella descrizione. L’elenco mostra solo il codice, il nome del prodotto e il prezzo minimo di vendita ed è ordinato in modo crescente in base al prezzo minimo di vendita dell’articolo da parte dei fornitori che lo offrono. L’utente può selezionare mediante un click un elemento dell'elenco e visualizzare nella stessa pagina i dati completi e l’elenco dei fornitori che lo vendono (questa azione rende l’articolo “visualizzato”). Per ogni fornitore in tale elenco compaiono: nome, valutazione, prezzo unitario, fasce di spesa di spedizione, importo minimo della spedizione gratuita e il numero degli articoli e valore totale degli articoli di quel fornitore che l’utente ha già messo nel carrello. Accanto all’offerta di ciascun fornitore compare un campo di input intero (quantità) e un bottone METTI NEL CARRELLO. L’inserimento nel carrello di una quantità maggiore di zero di articoli comporta l’aggiornamento del contenuto del  carrello e la visualizzazione della pagina CARRELLO. Questa mostra gli articoli inseriti, raggruppati per fornitore. Per ogni fornitore nel carrello si vedono la lista degli articoli, il prezzo totale degli articoli e il prezzo della spedizione calcolato in base alla politica del fornitore. Per ogni fornitore  compare un bottone ORDINA. Premere il bottone comporta l’eliminazione degli articoli del fornitore dal carrello e la creazione di un ordine corrispondente. Un </a:t>
             </a:r>
             <a:r>
               <a:rPr lang="it-IT" dirty="0">
@@ -8347,11 +8315,7 @@
             </a:pPr>
             <a:r>
               <a:rPr lang="it-IT" dirty="0"/>
-              <a:t>L’applicazione NON salva il carrello nella base di dati ma solo gli ordini</a:t>
-            </a:r>
-            <a:r>
-              <a:rPr lang="it-IT" dirty="0"/>
-              <a:t>.</a:t>
+              <a:t>L’applicazione NON salva il carrello nella base di dati ma solo gli ordini.</a:t>
             </a:r>
           </a:p>
           <a:p>
@@ -9111,23 +9075,7 @@
                   <a:srgbClr val="00B050"/>
                 </a:solidFill>
               </a:rPr>
-              <a:t>view comp</a:t>
-            </a:r>
-            <a:r>
-              <a:rPr lang="it-IT" dirty="0">
-                <a:solidFill>
-                  <a:srgbClr val="00B050"/>
-                </a:solidFill>
-              </a:rPr>
-              <a:t>one</a:t>
-            </a:r>
-            <a:r>
-              <a:rPr lang="it-IT" dirty="0">
-                <a:solidFill>
-                  <a:srgbClr val="00B050"/>
-                </a:solidFill>
-              </a:rPr>
-              <a:t>nts</a:t>
+              <a:t>view components</a:t>
             </a:r>
             <a:r>
               <a:rPr lang="it-IT" dirty="0"/>
@@ -9139,23 +9087,7 @@
                   <a:srgbClr val="00B0F0"/>
                 </a:solidFill>
               </a:rPr>
-              <a:t>e</a:t>
-            </a:r>
-            <a:r>
-              <a:rPr lang="it-IT" dirty="0">
-                <a:solidFill>
-                  <a:srgbClr val="00B0F0"/>
-                </a:solidFill>
-              </a:rPr>
-              <a:t>vent</a:t>
-            </a:r>
-            <a:r>
-              <a:rPr lang="it-IT" dirty="0">
-                <a:solidFill>
-                  <a:srgbClr val="00B0F0"/>
-                </a:solidFill>
-              </a:rPr>
-              <a:t>s</a:t>
+              <a:t>events</a:t>
             </a:r>
             <a:r>
               <a:rPr lang="it-IT" dirty="0"/>
@@ -11152,6 +11084,12 @@
 </file>
 
 <file path=customXml/item1.xml><?xml version="1.0" encoding="utf-8"?>
+<p:properties xmlns:p="http://schemas.microsoft.com/office/2006/metadata/properties" xmlns:xsi="http://www.w3.org/2001/XMLSchema-instance" xmlns:pc="http://schemas.microsoft.com/office/infopath/2007/PartnerControls">
+  <documentManagement/>
+</p:properties>
+</file>
+
+<file path=customXml/item2.xml><?xml version="1.0" encoding="utf-8"?>
 <ct:contentTypeSchema xmlns:ct="http://schemas.microsoft.com/office/2006/metadata/contentType" xmlns:ma="http://schemas.microsoft.com/office/2006/metadata/properties/metaAttributes" ct:_="" ma:_="" ma:contentTypeName="Documento" ma:contentTypeID="0x01010046786F36D954514C8C4DA2A6EEE37D0F" ma:contentTypeVersion="14" ma:contentTypeDescription="Creare un nuovo documento." ma:contentTypeScope="" ma:versionID="b9e60e88b710db64b0ab38dea9b29f9c">
   <xsd:schema xmlns:xsd="http://www.w3.org/2001/XMLSchema" xmlns:xs="http://www.w3.org/2001/XMLSchema" xmlns:p="http://schemas.microsoft.com/office/2006/metadata/properties" xmlns:ns3="7faec442-65fb-4342-af88-d7bf081dd003" xmlns:ns4="a39ed30e-e404-40bb-8308-aa03e085f91e" targetNamespace="http://schemas.microsoft.com/office/2006/metadata/properties" ma:root="true" ma:fieldsID="b9a9f95ae0ca4e8f43f16b997350fcda" ns3:_="" ns4:_="">
     <xsd:import namespace="7faec442-65fb-4342-af88-d7bf081dd003"/>
@@ -11380,12 +11318,6 @@
 </ct:contentTypeSchema>
 </file>
 
-<file path=customXml/item2.xml><?xml version="1.0" encoding="utf-8"?>
-<p:properties xmlns:p="http://schemas.microsoft.com/office/2006/metadata/properties" xmlns:xsi="http://www.w3.org/2001/XMLSchema-instance" xmlns:pc="http://schemas.microsoft.com/office/infopath/2007/PartnerControls">
-  <documentManagement/>
-</p:properties>
-</file>
-
 <file path=customXml/item3.xml><?xml version="1.0" encoding="utf-8"?>
 <?mso-contentType ?>
 <FormTemplates xmlns="http://schemas.microsoft.com/sharepoint/v3/contenttype/forms">
@@ -11396,6 +11328,23 @@
 </file>
 
 <file path=customXml/itemProps1.xml><?xml version="1.0" encoding="utf-8"?>
+<ds:datastoreItem xmlns:ds="http://schemas.openxmlformats.org/officeDocument/2006/customXml" ds:itemID="{C3A5048E-4585-4A41-9B60-63684990786A}">
+  <ds:schemaRefs>
+    <ds:schemaRef ds:uri="http://schemas.microsoft.com/office/2006/metadata/properties"/>
+    <ds:schemaRef ds:uri="http://purl.org/dc/dcmitype/"/>
+    <ds:schemaRef ds:uri="http://schemas.microsoft.com/office/2006/documentManagement/types"/>
+    <ds:schemaRef ds:uri="7faec442-65fb-4342-af88-d7bf081dd003"/>
+    <ds:schemaRef ds:uri="http://purl.org/dc/elements/1.1/"/>
+    <ds:schemaRef ds:uri="http://schemas.microsoft.com/office/infopath/2007/PartnerControls"/>
+    <ds:schemaRef ds:uri="http://schemas.openxmlformats.org/package/2006/metadata/core-properties"/>
+    <ds:schemaRef ds:uri="a39ed30e-e404-40bb-8308-aa03e085f91e"/>
+    <ds:schemaRef ds:uri="http://www.w3.org/XML/1998/namespace"/>
+    <ds:schemaRef ds:uri="http://purl.org/dc/terms/"/>
+  </ds:schemaRefs>
+</ds:datastoreItem>
+</file>
+
+<file path=customXml/itemProps2.xml><?xml version="1.0" encoding="utf-8"?>
 <ds:datastoreItem xmlns:ds="http://schemas.openxmlformats.org/officeDocument/2006/customXml" ds:itemID="{C8A32B3B-8FD5-487D-8647-E146B21A957D}">
   <ds:schemaRefs>
     <ds:schemaRef ds:uri="http://schemas.microsoft.com/office/2006/metadata/contentType"/>
@@ -11414,23 +11363,6 @@
 </ds:datastoreItem>
 </file>
 
-<file path=customXml/itemProps2.xml><?xml version="1.0" encoding="utf-8"?>
-<ds:datastoreItem xmlns:ds="http://schemas.openxmlformats.org/officeDocument/2006/customXml" ds:itemID="{C3A5048E-4585-4A41-9B60-63684990786A}">
-  <ds:schemaRefs>
-    <ds:schemaRef ds:uri="http://schemas.microsoft.com/office/2006/documentManagement/types"/>
-    <ds:schemaRef ds:uri="7faec442-65fb-4342-af88-d7bf081dd003"/>
-    <ds:schemaRef ds:uri="http://schemas.openxmlformats.org/package/2006/metadata/core-properties"/>
-    <ds:schemaRef ds:uri="http://schemas.microsoft.com/office/2006/metadata/properties"/>
-    <ds:schemaRef ds:uri="http://www.w3.org/XML/1998/namespace"/>
-    <ds:schemaRef ds:uri="http://purl.org/dc/dcmitype/"/>
-    <ds:schemaRef ds:uri="http://purl.org/dc/terms/"/>
-    <ds:schemaRef ds:uri="http://purl.org/dc/elements/1.1/"/>
-    <ds:schemaRef ds:uri="http://schemas.microsoft.com/office/infopath/2007/PartnerControls"/>
-    <ds:schemaRef ds:uri="a39ed30e-e404-40bb-8308-aa03e085f91e"/>
-  </ds:schemaRefs>
-</ds:datastoreItem>
-</file>
-
 <file path=customXml/itemProps3.xml><?xml version="1.0" encoding="utf-8"?>
 <ds:datastoreItem xmlns:ds="http://schemas.openxmlformats.org/officeDocument/2006/customXml" ds:itemID="{61FAD3DF-8367-436C-B779-79F89133C2B9}">
   <ds:schemaRefs>

</xml_diff>